<commit_message>
varies physical parameters w/ time
</commit_message>
<xml_diff>
--- a/docs/research-presentation-12-01-23.pptx
+++ b/docs/research-presentation-12-01-23.pptx
@@ -8,16 +8,26 @@
     <p:sldId id="256" r:id="rId2"/>
     <p:sldId id="257" r:id="rId3"/>
     <p:sldId id="259" r:id="rId4"/>
-    <p:sldId id="260" r:id="rId5"/>
-    <p:sldId id="261" r:id="rId6"/>
-    <p:sldId id="262" r:id="rId7"/>
-    <p:sldId id="258" r:id="rId8"/>
-    <p:sldId id="263" r:id="rId9"/>
-    <p:sldId id="266" r:id="rId10"/>
-    <p:sldId id="265" r:id="rId11"/>
-    <p:sldId id="264" r:id="rId12"/>
-    <p:sldId id="267" r:id="rId13"/>
-    <p:sldId id="268" r:id="rId14"/>
+    <p:sldId id="278" r:id="rId5"/>
+    <p:sldId id="276" r:id="rId6"/>
+    <p:sldId id="277" r:id="rId7"/>
+    <p:sldId id="260" r:id="rId8"/>
+    <p:sldId id="261" r:id="rId9"/>
+    <p:sldId id="269" r:id="rId10"/>
+    <p:sldId id="270" r:id="rId11"/>
+    <p:sldId id="271" r:id="rId12"/>
+    <p:sldId id="272" r:id="rId13"/>
+    <p:sldId id="262" r:id="rId14"/>
+    <p:sldId id="258" r:id="rId15"/>
+    <p:sldId id="263" r:id="rId16"/>
+    <p:sldId id="266" r:id="rId17"/>
+    <p:sldId id="265" r:id="rId18"/>
+    <p:sldId id="264" r:id="rId19"/>
+    <p:sldId id="267" r:id="rId20"/>
+    <p:sldId id="268" r:id="rId21"/>
+    <p:sldId id="273" r:id="rId22"/>
+    <p:sldId id="275" r:id="rId23"/>
+    <p:sldId id="274" r:id="rId24"/>
   </p:sldIdLst>
   <p:sldSz cx="12192000" cy="6858000"/>
   <p:notesSz cx="6858000" cy="9144000"/>
@@ -116,6 +126,11 @@
       </a:defRPr>
     </a:lvl9pPr>
   </p:defaultTextStyle>
+  <p:extLst>
+    <p:ext uri="{EFAFB233-063F-42B5-8137-9DF3F51BA10A}">
+      <p15:sldGuideLst xmlns:p15="http://schemas.microsoft.com/office/powerpoint/2012/main"/>
+    </p:ext>
+  </p:extLst>
 </p:presentation>
 </file>
 
@@ -266,7 +281,7 @@
           <a:p>
             <a:fld id="{51392AE0-5298-4264-9AF0-806B42BA1C93}" type="datetimeFigureOut">
               <a:rPr lang="en-US" smtClean="0"/>
-              <a:t>11/30/2023</a:t>
+              <a:t>12/1/2023</a:t>
             </a:fld>
             <a:endParaRPr lang="en-US"/>
           </a:p>
@@ -464,7 +479,7 @@
           <a:p>
             <a:fld id="{51392AE0-5298-4264-9AF0-806B42BA1C93}" type="datetimeFigureOut">
               <a:rPr lang="en-US" smtClean="0"/>
-              <a:t>11/30/2023</a:t>
+              <a:t>12/1/2023</a:t>
             </a:fld>
             <a:endParaRPr lang="en-US"/>
           </a:p>
@@ -672,7 +687,7 @@
           <a:p>
             <a:fld id="{51392AE0-5298-4264-9AF0-806B42BA1C93}" type="datetimeFigureOut">
               <a:rPr lang="en-US" smtClean="0"/>
-              <a:t>11/30/2023</a:t>
+              <a:t>12/1/2023</a:t>
             </a:fld>
             <a:endParaRPr lang="en-US"/>
           </a:p>
@@ -870,7 +885,7 @@
           <a:p>
             <a:fld id="{51392AE0-5298-4264-9AF0-806B42BA1C93}" type="datetimeFigureOut">
               <a:rPr lang="en-US" smtClean="0"/>
-              <a:t>11/30/2023</a:t>
+              <a:t>12/1/2023</a:t>
             </a:fld>
             <a:endParaRPr lang="en-US"/>
           </a:p>
@@ -1145,7 +1160,7 @@
           <a:p>
             <a:fld id="{51392AE0-5298-4264-9AF0-806B42BA1C93}" type="datetimeFigureOut">
               <a:rPr lang="en-US" smtClean="0"/>
-              <a:t>11/30/2023</a:t>
+              <a:t>12/1/2023</a:t>
             </a:fld>
             <a:endParaRPr lang="en-US"/>
           </a:p>
@@ -1410,7 +1425,7 @@
           <a:p>
             <a:fld id="{51392AE0-5298-4264-9AF0-806B42BA1C93}" type="datetimeFigureOut">
               <a:rPr lang="en-US" smtClean="0"/>
-              <a:t>11/30/2023</a:t>
+              <a:t>12/1/2023</a:t>
             </a:fld>
             <a:endParaRPr lang="en-US"/>
           </a:p>
@@ -1822,7 +1837,7 @@
           <a:p>
             <a:fld id="{51392AE0-5298-4264-9AF0-806B42BA1C93}" type="datetimeFigureOut">
               <a:rPr lang="en-US" smtClean="0"/>
-              <a:t>11/30/2023</a:t>
+              <a:t>12/1/2023</a:t>
             </a:fld>
             <a:endParaRPr lang="en-US"/>
           </a:p>
@@ -1963,7 +1978,7 @@
           <a:p>
             <a:fld id="{51392AE0-5298-4264-9AF0-806B42BA1C93}" type="datetimeFigureOut">
               <a:rPr lang="en-US" smtClean="0"/>
-              <a:t>11/30/2023</a:t>
+              <a:t>12/1/2023</a:t>
             </a:fld>
             <a:endParaRPr lang="en-US"/>
           </a:p>
@@ -2076,7 +2091,7 @@
           <a:p>
             <a:fld id="{51392AE0-5298-4264-9AF0-806B42BA1C93}" type="datetimeFigureOut">
               <a:rPr lang="en-US" smtClean="0"/>
-              <a:t>11/30/2023</a:t>
+              <a:t>12/1/2023</a:t>
             </a:fld>
             <a:endParaRPr lang="en-US"/>
           </a:p>
@@ -2387,7 +2402,7 @@
           <a:p>
             <a:fld id="{51392AE0-5298-4264-9AF0-806B42BA1C93}" type="datetimeFigureOut">
               <a:rPr lang="en-US" smtClean="0"/>
-              <a:t>11/30/2023</a:t>
+              <a:t>12/1/2023</a:t>
             </a:fld>
             <a:endParaRPr lang="en-US"/>
           </a:p>
@@ -2675,7 +2690,7 @@
           <a:p>
             <a:fld id="{51392AE0-5298-4264-9AF0-806B42BA1C93}" type="datetimeFigureOut">
               <a:rPr lang="en-US" smtClean="0"/>
-              <a:t>11/30/2023</a:t>
+              <a:t>12/1/2023</a:t>
             </a:fld>
             <a:endParaRPr lang="en-US"/>
           </a:p>
@@ -2916,7 +2931,7 @@
           <a:p>
             <a:fld id="{51392AE0-5298-4264-9AF0-806B42BA1C93}" type="datetimeFigureOut">
               <a:rPr lang="en-US" smtClean="0"/>
-              <a:t>11/30/2023</a:t>
+              <a:t>12/1/2023</a:t>
             </a:fld>
             <a:endParaRPr lang="en-US"/>
           </a:p>
@@ -3441,6 +3456,643 @@
           <p:cNvPr id="2" name="Title 1">
             <a:extLst>
               <a:ext uri="{FF2B5EF4-FFF2-40B4-BE49-F238E27FC236}">
+                <a16:creationId xmlns:a16="http://schemas.microsoft.com/office/drawing/2014/main" id="{DD6B75D5-5768-FDEC-2CD5-C5875202FF03}"/>
+              </a:ext>
+            </a:extLst>
+          </p:cNvPr>
+          <p:cNvSpPr>
+            <a:spLocks noGrp="1"/>
+          </p:cNvSpPr>
+          <p:nvPr>
+            <p:ph type="title"/>
+          </p:nvPr>
+        </p:nvSpPr>
+        <p:spPr/>
+        <p:txBody>
+          <a:bodyPr/>
+          <a:lstStyle/>
+          <a:p>
+            <a:r>
+              <a:rPr lang="en-US" dirty="0"/>
+              <a:t>Results</a:t>
+            </a:r>
+          </a:p>
+        </p:txBody>
+      </p:sp>
+      <p:pic>
+        <p:nvPicPr>
+          <p:cNvPr id="5" name="Content Placeholder 4">
+            <a:extLst>
+              <a:ext uri="{FF2B5EF4-FFF2-40B4-BE49-F238E27FC236}">
+                <a16:creationId xmlns:a16="http://schemas.microsoft.com/office/drawing/2014/main" id="{CB7BD481-C5FD-35B3-19F9-0405E03CCCF0}"/>
+              </a:ext>
+            </a:extLst>
+          </p:cNvPr>
+          <p:cNvPicPr>
+            <a:picLocks noGrp="1" noChangeAspect="1"/>
+          </p:cNvPicPr>
+          <p:nvPr>
+            <p:ph idx="1"/>
+          </p:nvPr>
+        </p:nvPicPr>
+        <p:blipFill>
+          <a:blip r:embed="rId2"/>
+          <a:stretch>
+            <a:fillRect/>
+          </a:stretch>
+        </p:blipFill>
+        <p:spPr>
+          <a:xfrm>
+            <a:off x="296361" y="2805344"/>
+            <a:ext cx="11599278" cy="2853297"/>
+          </a:xfrm>
+        </p:spPr>
+      </p:pic>
+    </p:spTree>
+    <p:extLst>
+      <p:ext uri="{BB962C8B-B14F-4D97-AF65-F5344CB8AC3E}">
+        <p14:creationId xmlns:p14="http://schemas.microsoft.com/office/powerpoint/2010/main" val="2102271631"/>
+      </p:ext>
+    </p:extLst>
+  </p:cSld>
+  <p:clrMapOvr>
+    <a:masterClrMapping/>
+  </p:clrMapOvr>
+</p:sld>
+</file>
+
+<file path=ppt/slides/slide11.xml><?xml version="1.0" encoding="utf-8"?>
+<p:sld xmlns:a="http://schemas.openxmlformats.org/drawingml/2006/main" xmlns:r="http://schemas.openxmlformats.org/officeDocument/2006/relationships" xmlns:p="http://schemas.openxmlformats.org/presentationml/2006/main">
+  <p:cSld>
+    <p:spTree>
+      <p:nvGrpSpPr>
+        <p:cNvPr id="1" name=""/>
+        <p:cNvGrpSpPr/>
+        <p:nvPr/>
+      </p:nvGrpSpPr>
+      <p:grpSpPr>
+        <a:xfrm>
+          <a:off x="0" y="0"/>
+          <a:ext cx="0" cy="0"/>
+          <a:chOff x="0" y="0"/>
+          <a:chExt cx="0" cy="0"/>
+        </a:xfrm>
+      </p:grpSpPr>
+      <p:sp>
+        <p:nvSpPr>
+          <p:cNvPr id="2" name="Title 1">
+            <a:extLst>
+              <a:ext uri="{FF2B5EF4-FFF2-40B4-BE49-F238E27FC236}">
+                <a16:creationId xmlns:a16="http://schemas.microsoft.com/office/drawing/2014/main" id="{9C6030B6-175F-9FD5-83B2-AC4ACE34EF57}"/>
+              </a:ext>
+            </a:extLst>
+          </p:cNvPr>
+          <p:cNvSpPr>
+            <a:spLocks noGrp="1"/>
+          </p:cNvSpPr>
+          <p:nvPr>
+            <p:ph type="title"/>
+          </p:nvPr>
+        </p:nvSpPr>
+        <p:spPr/>
+        <p:txBody>
+          <a:bodyPr/>
+          <a:lstStyle/>
+          <a:p>
+            <a:r>
+              <a:rPr lang="en-US" dirty="0"/>
+              <a:t>Parameters</a:t>
+            </a:r>
+          </a:p>
+        </p:txBody>
+      </p:sp>
+      <p:pic>
+        <p:nvPicPr>
+          <p:cNvPr id="5" name="Content Placeholder 4">
+            <a:extLst>
+              <a:ext uri="{FF2B5EF4-FFF2-40B4-BE49-F238E27FC236}">
+                <a16:creationId xmlns:a16="http://schemas.microsoft.com/office/drawing/2014/main" id="{6A95D6FF-232D-E68A-1C23-A42202C04B50}"/>
+              </a:ext>
+            </a:extLst>
+          </p:cNvPr>
+          <p:cNvPicPr>
+            <a:picLocks noGrp="1" noChangeAspect="1"/>
+          </p:cNvPicPr>
+          <p:nvPr>
+            <p:ph idx="1"/>
+          </p:nvPr>
+        </p:nvPicPr>
+        <p:blipFill>
+          <a:blip r:embed="rId2"/>
+          <a:stretch>
+            <a:fillRect/>
+          </a:stretch>
+        </p:blipFill>
+        <p:spPr>
+          <a:xfrm>
+            <a:off x="838200" y="2502569"/>
+            <a:ext cx="10279883" cy="2493885"/>
+          </a:xfrm>
+        </p:spPr>
+      </p:pic>
+    </p:spTree>
+    <p:extLst>
+      <p:ext uri="{BB962C8B-B14F-4D97-AF65-F5344CB8AC3E}">
+        <p14:creationId xmlns:p14="http://schemas.microsoft.com/office/powerpoint/2010/main" val="704422725"/>
+      </p:ext>
+    </p:extLst>
+  </p:cSld>
+  <p:clrMapOvr>
+    <a:masterClrMapping/>
+  </p:clrMapOvr>
+</p:sld>
+</file>
+
+<file path=ppt/slides/slide12.xml><?xml version="1.0" encoding="utf-8"?>
+<p:sld xmlns:a="http://schemas.openxmlformats.org/drawingml/2006/main" xmlns:r="http://schemas.openxmlformats.org/officeDocument/2006/relationships" xmlns:p="http://schemas.openxmlformats.org/presentationml/2006/main">
+  <p:cSld>
+    <p:spTree>
+      <p:nvGrpSpPr>
+        <p:cNvPr id="1" name=""/>
+        <p:cNvGrpSpPr/>
+        <p:nvPr/>
+      </p:nvGrpSpPr>
+      <p:grpSpPr>
+        <a:xfrm>
+          <a:off x="0" y="0"/>
+          <a:ext cx="0" cy="0"/>
+          <a:chOff x="0" y="0"/>
+          <a:chExt cx="0" cy="0"/>
+        </a:xfrm>
+      </p:grpSpPr>
+      <p:sp>
+        <p:nvSpPr>
+          <p:cNvPr id="2" name="Title 1">
+            <a:extLst>
+              <a:ext uri="{FF2B5EF4-FFF2-40B4-BE49-F238E27FC236}">
+                <a16:creationId xmlns:a16="http://schemas.microsoft.com/office/drawing/2014/main" id="{AAAF067D-EF3B-4ECA-95EE-A3248514B84B}"/>
+              </a:ext>
+            </a:extLst>
+          </p:cNvPr>
+          <p:cNvSpPr>
+            <a:spLocks noGrp="1"/>
+          </p:cNvSpPr>
+          <p:nvPr>
+            <p:ph type="title"/>
+          </p:nvPr>
+        </p:nvSpPr>
+        <p:spPr/>
+        <p:txBody>
+          <a:bodyPr/>
+          <a:lstStyle/>
+          <a:p>
+            <a:r>
+              <a:rPr lang="en-US" dirty="0"/>
+              <a:t>Result</a:t>
+            </a:r>
+          </a:p>
+        </p:txBody>
+      </p:sp>
+      <p:pic>
+        <p:nvPicPr>
+          <p:cNvPr id="5" name="Content Placeholder 4">
+            <a:extLst>
+              <a:ext uri="{FF2B5EF4-FFF2-40B4-BE49-F238E27FC236}">
+                <a16:creationId xmlns:a16="http://schemas.microsoft.com/office/drawing/2014/main" id="{BC7942AE-4C82-3A97-17B4-4CBBBBEF9C1E}"/>
+              </a:ext>
+            </a:extLst>
+          </p:cNvPr>
+          <p:cNvPicPr>
+            <a:picLocks noGrp="1" noChangeAspect="1"/>
+          </p:cNvPicPr>
+          <p:nvPr>
+            <p:ph idx="1"/>
+          </p:nvPr>
+        </p:nvPicPr>
+        <p:blipFill>
+          <a:blip r:embed="rId2"/>
+          <a:stretch>
+            <a:fillRect/>
+          </a:stretch>
+        </p:blipFill>
+        <p:spPr>
+          <a:xfrm>
+            <a:off x="111290" y="2565648"/>
+            <a:ext cx="11969419" cy="2940290"/>
+          </a:xfrm>
+        </p:spPr>
+      </p:pic>
+    </p:spTree>
+    <p:extLst>
+      <p:ext uri="{BB962C8B-B14F-4D97-AF65-F5344CB8AC3E}">
+        <p14:creationId xmlns:p14="http://schemas.microsoft.com/office/powerpoint/2010/main" val="3180913199"/>
+      </p:ext>
+    </p:extLst>
+  </p:cSld>
+  <p:clrMapOvr>
+    <a:masterClrMapping/>
+  </p:clrMapOvr>
+</p:sld>
+</file>
+
+<file path=ppt/slides/slide13.xml><?xml version="1.0" encoding="utf-8"?>
+<p:sld xmlns:a="http://schemas.openxmlformats.org/drawingml/2006/main" xmlns:r="http://schemas.openxmlformats.org/officeDocument/2006/relationships" xmlns:p="http://schemas.openxmlformats.org/presentationml/2006/main">
+  <p:cSld>
+    <p:spTree>
+      <p:nvGrpSpPr>
+        <p:cNvPr id="1" name=""/>
+        <p:cNvGrpSpPr/>
+        <p:nvPr/>
+      </p:nvGrpSpPr>
+      <p:grpSpPr>
+        <a:xfrm>
+          <a:off x="0" y="0"/>
+          <a:ext cx="0" cy="0"/>
+          <a:chOff x="0" y="0"/>
+          <a:chExt cx="0" cy="0"/>
+        </a:xfrm>
+      </p:grpSpPr>
+      <p:sp>
+        <p:nvSpPr>
+          <p:cNvPr id="2" name="Title 1">
+            <a:extLst>
+              <a:ext uri="{FF2B5EF4-FFF2-40B4-BE49-F238E27FC236}">
+                <a16:creationId xmlns:a16="http://schemas.microsoft.com/office/drawing/2014/main" id="{305064E6-1E3C-D652-74CA-46CD9B71DBB7}"/>
+              </a:ext>
+            </a:extLst>
+          </p:cNvPr>
+          <p:cNvSpPr>
+            <a:spLocks noGrp="1"/>
+          </p:cNvSpPr>
+          <p:nvPr>
+            <p:ph type="title"/>
+          </p:nvPr>
+        </p:nvSpPr>
+        <p:spPr/>
+        <p:txBody>
+          <a:bodyPr/>
+          <a:lstStyle/>
+          <a:p>
+            <a:r>
+              <a:rPr lang="en-US" dirty="0"/>
+              <a:t>New Model to test for multiple outputs </a:t>
+            </a:r>
+          </a:p>
+        </p:txBody>
+      </p:sp>
+      <p:pic>
+        <p:nvPicPr>
+          <p:cNvPr id="6" name="Content Placeholder 5" descr="A diagram of a mathematical equation&#10;&#10;Description automatically generated">
+            <a:extLst>
+              <a:ext uri="{FF2B5EF4-FFF2-40B4-BE49-F238E27FC236}">
+                <a16:creationId xmlns:a16="http://schemas.microsoft.com/office/drawing/2014/main" id="{3F47BC64-785C-0C1E-3ECE-502509F5FAA2}"/>
+              </a:ext>
+            </a:extLst>
+          </p:cNvPr>
+          <p:cNvPicPr>
+            <a:picLocks noGrp="1" noChangeAspect="1"/>
+          </p:cNvPicPr>
+          <p:nvPr>
+            <p:ph idx="1"/>
+          </p:nvPr>
+        </p:nvPicPr>
+        <p:blipFill>
+          <a:blip r:embed="rId2">
+            <a:extLst>
+              <a:ext uri="{28A0092B-C50C-407E-A947-70E740481C1C}">
+                <a14:useLocalDpi xmlns:a14="http://schemas.microsoft.com/office/drawing/2010/main" val="0"/>
+              </a:ext>
+            </a:extLst>
+          </a:blip>
+          <a:stretch>
+            <a:fillRect/>
+          </a:stretch>
+        </p:blipFill>
+        <p:spPr>
+          <a:xfrm>
+            <a:off x="1864155" y="1774235"/>
+            <a:ext cx="8001896" cy="4893246"/>
+          </a:xfrm>
+        </p:spPr>
+      </p:pic>
+    </p:spTree>
+    <p:extLst>
+      <p:ext uri="{BB962C8B-B14F-4D97-AF65-F5344CB8AC3E}">
+        <p14:creationId xmlns:p14="http://schemas.microsoft.com/office/powerpoint/2010/main" val="1780559682"/>
+      </p:ext>
+    </p:extLst>
+  </p:cSld>
+  <p:clrMapOvr>
+    <a:masterClrMapping/>
+  </p:clrMapOvr>
+</p:sld>
+</file>
+
+<file path=ppt/slides/slide14.xml><?xml version="1.0" encoding="utf-8"?>
+<p:sld xmlns:a="http://schemas.openxmlformats.org/drawingml/2006/main" xmlns:r="http://schemas.openxmlformats.org/officeDocument/2006/relationships" xmlns:p="http://schemas.openxmlformats.org/presentationml/2006/main">
+  <p:cSld>
+    <p:spTree>
+      <p:nvGrpSpPr>
+        <p:cNvPr id="1" name=""/>
+        <p:cNvGrpSpPr/>
+        <p:nvPr/>
+      </p:nvGrpSpPr>
+      <p:grpSpPr>
+        <a:xfrm>
+          <a:off x="0" y="0"/>
+          <a:ext cx="0" cy="0"/>
+          <a:chOff x="0" y="0"/>
+          <a:chExt cx="0" cy="0"/>
+        </a:xfrm>
+      </p:grpSpPr>
+      <p:pic>
+        <p:nvPicPr>
+          <p:cNvPr id="5" name="Content Placeholder 4">
+            <a:extLst>
+              <a:ext uri="{FF2B5EF4-FFF2-40B4-BE49-F238E27FC236}">
+                <a16:creationId xmlns:a16="http://schemas.microsoft.com/office/drawing/2014/main" id="{07C9CD3D-28B3-6FCE-DACF-465354BED401}"/>
+              </a:ext>
+            </a:extLst>
+          </p:cNvPr>
+          <p:cNvPicPr>
+            <a:picLocks noGrp="1" noChangeAspect="1"/>
+          </p:cNvPicPr>
+          <p:nvPr>
+            <p:ph idx="1"/>
+          </p:nvPr>
+        </p:nvPicPr>
+        <p:blipFill>
+          <a:blip r:embed="rId2"/>
+          <a:stretch>
+            <a:fillRect/>
+          </a:stretch>
+        </p:blipFill>
+        <p:spPr>
+          <a:xfrm>
+            <a:off x="72206" y="55643"/>
+            <a:ext cx="8605140" cy="6553077"/>
+          </a:xfrm>
+        </p:spPr>
+      </p:pic>
+      <p:sp>
+        <p:nvSpPr>
+          <p:cNvPr id="7" name="TextBox 6">
+            <a:extLst>
+              <a:ext uri="{FF2B5EF4-FFF2-40B4-BE49-F238E27FC236}">
+                <a16:creationId xmlns:a16="http://schemas.microsoft.com/office/drawing/2014/main" id="{0EBBC1A2-70D7-0CEA-4D7B-9010CC4348E8}"/>
+              </a:ext>
+            </a:extLst>
+          </p:cNvPr>
+          <p:cNvSpPr txBox="1"/>
+          <p:nvPr/>
+        </p:nvSpPr>
+        <p:spPr>
+          <a:xfrm>
+            <a:off x="8915319" y="5803752"/>
+            <a:ext cx="3204475" cy="954107"/>
+          </a:xfrm>
+          <a:prstGeom prst="rect">
+            <a:avLst/>
+          </a:prstGeom>
+          <a:noFill/>
+        </p:spPr>
+        <p:txBody>
+          <a:bodyPr wrap="square" rtlCol="0">
+            <a:spAutoFit/>
+          </a:bodyPr>
+          <a:lstStyle/>
+          <a:p>
+            <a:r>
+              <a:rPr lang="en-US" sz="2800" dirty="0"/>
+              <a:t>Simulink model of 2MSD</a:t>
+            </a:r>
+          </a:p>
+        </p:txBody>
+      </p:sp>
+    </p:spTree>
+    <p:extLst>
+      <p:ext uri="{BB962C8B-B14F-4D97-AF65-F5344CB8AC3E}">
+        <p14:creationId xmlns:p14="http://schemas.microsoft.com/office/powerpoint/2010/main" val="3506511005"/>
+      </p:ext>
+    </p:extLst>
+  </p:cSld>
+  <p:clrMapOvr>
+    <a:masterClrMapping/>
+  </p:clrMapOvr>
+</p:sld>
+</file>
+
+<file path=ppt/slides/slide15.xml><?xml version="1.0" encoding="utf-8"?>
+<p:sld xmlns:a="http://schemas.openxmlformats.org/drawingml/2006/main" xmlns:r="http://schemas.openxmlformats.org/officeDocument/2006/relationships" xmlns:p="http://schemas.openxmlformats.org/presentationml/2006/main">
+  <p:cSld>
+    <p:spTree>
+      <p:nvGrpSpPr>
+        <p:cNvPr id="1" name=""/>
+        <p:cNvGrpSpPr/>
+        <p:nvPr/>
+      </p:nvGrpSpPr>
+      <p:grpSpPr>
+        <a:xfrm>
+          <a:off x="0" y="0"/>
+          <a:ext cx="0" cy="0"/>
+          <a:chOff x="0" y="0"/>
+          <a:chExt cx="0" cy="0"/>
+        </a:xfrm>
+      </p:grpSpPr>
+      <p:sp>
+        <p:nvSpPr>
+          <p:cNvPr id="2" name="Title 1">
+            <a:extLst>
+              <a:ext uri="{FF2B5EF4-FFF2-40B4-BE49-F238E27FC236}">
+                <a16:creationId xmlns:a16="http://schemas.microsoft.com/office/drawing/2014/main" id="{A962EF12-A15C-8C57-5D8B-FBD099D18524}"/>
+              </a:ext>
+            </a:extLst>
+          </p:cNvPr>
+          <p:cNvSpPr>
+            <a:spLocks noGrp="1"/>
+          </p:cNvSpPr>
+          <p:nvPr>
+            <p:ph type="title"/>
+          </p:nvPr>
+        </p:nvSpPr>
+        <p:spPr/>
+        <p:txBody>
+          <a:bodyPr/>
+          <a:lstStyle/>
+          <a:p>
+            <a:r>
+              <a:rPr lang="en-US" dirty="0"/>
+              <a:t>Using custom inputs in </a:t>
+            </a:r>
+            <a:r>
+              <a:rPr lang="en-US" dirty="0" err="1"/>
+              <a:t>FMPy</a:t>
+            </a:r>
+            <a:r>
+              <a:rPr lang="en-US" dirty="0"/>
+              <a:t>:</a:t>
+            </a:r>
+          </a:p>
+        </p:txBody>
+      </p:sp>
+      <p:pic>
+        <p:nvPicPr>
+          <p:cNvPr id="5" name="Content Placeholder 4">
+            <a:extLst>
+              <a:ext uri="{FF2B5EF4-FFF2-40B4-BE49-F238E27FC236}">
+                <a16:creationId xmlns:a16="http://schemas.microsoft.com/office/drawing/2014/main" id="{B38F6F4A-E1A3-7002-43B4-6073D4201A13}"/>
+              </a:ext>
+            </a:extLst>
+          </p:cNvPr>
+          <p:cNvPicPr>
+            <a:picLocks noGrp="1" noChangeAspect="1"/>
+          </p:cNvPicPr>
+          <p:nvPr>
+            <p:ph idx="1"/>
+          </p:nvPr>
+        </p:nvPicPr>
+        <p:blipFill>
+          <a:blip r:embed="rId2"/>
+          <a:stretch>
+            <a:fillRect/>
+          </a:stretch>
+        </p:blipFill>
+        <p:spPr>
+          <a:xfrm>
+            <a:off x="426720" y="1391908"/>
+            <a:ext cx="11338559" cy="5466092"/>
+          </a:xfrm>
+        </p:spPr>
+      </p:pic>
+    </p:spTree>
+    <p:extLst>
+      <p:ext uri="{BB962C8B-B14F-4D97-AF65-F5344CB8AC3E}">
+        <p14:creationId xmlns:p14="http://schemas.microsoft.com/office/powerpoint/2010/main" val="4225417103"/>
+      </p:ext>
+    </p:extLst>
+  </p:cSld>
+  <p:clrMapOvr>
+    <a:masterClrMapping/>
+  </p:clrMapOvr>
+</p:sld>
+</file>
+
+<file path=ppt/slides/slide16.xml><?xml version="1.0" encoding="utf-8"?>
+<p:sld xmlns:a="http://schemas.openxmlformats.org/drawingml/2006/main" xmlns:r="http://schemas.openxmlformats.org/officeDocument/2006/relationships" xmlns:p="http://schemas.openxmlformats.org/presentationml/2006/main">
+  <p:cSld>
+    <p:spTree>
+      <p:nvGrpSpPr>
+        <p:cNvPr id="1" name=""/>
+        <p:cNvGrpSpPr/>
+        <p:nvPr/>
+      </p:nvGrpSpPr>
+      <p:grpSpPr>
+        <a:xfrm>
+          <a:off x="0" y="0"/>
+          <a:ext cx="0" cy="0"/>
+          <a:chOff x="0" y="0"/>
+          <a:chExt cx="0" cy="0"/>
+        </a:xfrm>
+      </p:grpSpPr>
+      <p:sp>
+        <p:nvSpPr>
+          <p:cNvPr id="2" name="Title 1">
+            <a:extLst>
+              <a:ext uri="{FF2B5EF4-FFF2-40B4-BE49-F238E27FC236}">
+                <a16:creationId xmlns:a16="http://schemas.microsoft.com/office/drawing/2014/main" id="{8F488DB1-7A35-C8AF-336D-A431D69DDD7C}"/>
+              </a:ext>
+            </a:extLst>
+          </p:cNvPr>
+          <p:cNvSpPr>
+            <a:spLocks noGrp="1"/>
+          </p:cNvSpPr>
+          <p:nvPr>
+            <p:ph type="title"/>
+          </p:nvPr>
+        </p:nvSpPr>
+        <p:spPr/>
+        <p:txBody>
+          <a:bodyPr/>
+          <a:lstStyle/>
+          <a:p>
+            <a:r>
+              <a:rPr lang="en-US" dirty="0" err="1"/>
+              <a:t>ScalarVariable</a:t>
+            </a:r>
+            <a:r>
+              <a:rPr lang="en-US" dirty="0"/>
+              <a:t> within the FMU 	</a:t>
+            </a:r>
+          </a:p>
+        </p:txBody>
+      </p:sp>
+      <p:pic>
+        <p:nvPicPr>
+          <p:cNvPr id="4" name="Content Placeholder 3">
+            <a:extLst>
+              <a:ext uri="{FF2B5EF4-FFF2-40B4-BE49-F238E27FC236}">
+                <a16:creationId xmlns:a16="http://schemas.microsoft.com/office/drawing/2014/main" id="{14430949-8163-DB78-4A70-C2D25C65EA98}"/>
+              </a:ext>
+            </a:extLst>
+          </p:cNvPr>
+          <p:cNvPicPr>
+            <a:picLocks noGrp="1" noChangeAspect="1"/>
+          </p:cNvPicPr>
+          <p:nvPr>
+            <p:ph idx="1"/>
+          </p:nvPr>
+        </p:nvPicPr>
+        <p:blipFill>
+          <a:blip r:embed="rId2"/>
+          <a:stretch>
+            <a:fillRect/>
+          </a:stretch>
+        </p:blipFill>
+        <p:spPr>
+          <a:xfrm>
+            <a:off x="0" y="1378486"/>
+            <a:ext cx="12273150" cy="5323527"/>
+          </a:xfrm>
+          <a:prstGeom prst="rect">
+            <a:avLst/>
+          </a:prstGeom>
+        </p:spPr>
+      </p:pic>
+    </p:spTree>
+    <p:extLst>
+      <p:ext uri="{BB962C8B-B14F-4D97-AF65-F5344CB8AC3E}">
+        <p14:creationId xmlns:p14="http://schemas.microsoft.com/office/powerpoint/2010/main" val="2234886692"/>
+      </p:ext>
+    </p:extLst>
+  </p:cSld>
+  <p:clrMapOvr>
+    <a:masterClrMapping/>
+  </p:clrMapOvr>
+</p:sld>
+</file>
+
+<file path=ppt/slides/slide17.xml><?xml version="1.0" encoding="utf-8"?>
+<p:sld xmlns:a="http://schemas.openxmlformats.org/drawingml/2006/main" xmlns:r="http://schemas.openxmlformats.org/officeDocument/2006/relationships" xmlns:p="http://schemas.openxmlformats.org/presentationml/2006/main">
+  <p:cSld>
+    <p:spTree>
+      <p:nvGrpSpPr>
+        <p:cNvPr id="1" name=""/>
+        <p:cNvGrpSpPr/>
+        <p:nvPr/>
+      </p:nvGrpSpPr>
+      <p:grpSpPr>
+        <a:xfrm>
+          <a:off x="0" y="0"/>
+          <a:ext cx="0" cy="0"/>
+          <a:chOff x="0" y="0"/>
+          <a:chExt cx="0" cy="0"/>
+        </a:xfrm>
+      </p:grpSpPr>
+      <p:sp>
+        <p:nvSpPr>
+          <p:cNvPr id="2" name="Title 1">
+            <a:extLst>
+              <a:ext uri="{FF2B5EF4-FFF2-40B4-BE49-F238E27FC236}">
                 <a16:creationId xmlns:a16="http://schemas.microsoft.com/office/drawing/2014/main" id="{CA596F91-1DE9-2E3D-D280-482B6D2A6315}"/>
               </a:ext>
             </a:extLst>
@@ -3506,7 +4158,7 @@
 </p:sld>
 </file>
 
-<file path=ppt/slides/slide11.xml><?xml version="1.0" encoding="utf-8"?>
+<file path=ppt/slides/slide18.xml><?xml version="1.0" encoding="utf-8"?>
 <p:sld xmlns:a="http://schemas.openxmlformats.org/drawingml/2006/main" xmlns:r="http://schemas.openxmlformats.org/officeDocument/2006/relationships" xmlns:p="http://schemas.openxmlformats.org/presentationml/2006/main">
   <p:cSld>
     <p:spTree>
@@ -3593,7 +4245,7 @@
 </p:sld>
 </file>
 
-<file path=ppt/slides/slide12.xml><?xml version="1.0" encoding="utf-8"?>
+<file path=ppt/slides/slide19.xml><?xml version="1.0" encoding="utf-8"?>
 <p:sld xmlns:a="http://schemas.openxmlformats.org/drawingml/2006/main" xmlns:r="http://schemas.openxmlformats.org/officeDocument/2006/relationships" xmlns:p="http://schemas.openxmlformats.org/presentationml/2006/main">
   <p:cSld>
     <p:spTree>
@@ -3680,7 +4332,119 @@
 </p:sld>
 </file>
 
-<file path=ppt/slides/slide13.xml><?xml version="1.0" encoding="utf-8"?>
+<file path=ppt/slides/slide2.xml><?xml version="1.0" encoding="utf-8"?>
+<p:sld xmlns:a="http://schemas.openxmlformats.org/drawingml/2006/main" xmlns:r="http://schemas.openxmlformats.org/officeDocument/2006/relationships" xmlns:p="http://schemas.openxmlformats.org/presentationml/2006/main">
+  <p:cSld>
+    <p:spTree>
+      <p:nvGrpSpPr>
+        <p:cNvPr id="1" name=""/>
+        <p:cNvGrpSpPr/>
+        <p:nvPr/>
+      </p:nvGrpSpPr>
+      <p:grpSpPr>
+        <a:xfrm>
+          <a:off x="0" y="0"/>
+          <a:ext cx="0" cy="0"/>
+          <a:chOff x="0" y="0"/>
+          <a:chExt cx="0" cy="0"/>
+        </a:xfrm>
+      </p:grpSpPr>
+      <p:sp>
+        <p:nvSpPr>
+          <p:cNvPr id="2" name="Title 1">
+            <a:extLst>
+              <a:ext uri="{FF2B5EF4-FFF2-40B4-BE49-F238E27FC236}">
+                <a16:creationId xmlns:a16="http://schemas.microsoft.com/office/drawing/2014/main" id="{31113DE3-AA41-9E16-3216-84DD3E9A63B7}"/>
+              </a:ext>
+            </a:extLst>
+          </p:cNvPr>
+          <p:cNvSpPr>
+            <a:spLocks noGrp="1"/>
+          </p:cNvSpPr>
+          <p:nvPr>
+            <p:ph type="title"/>
+          </p:nvPr>
+        </p:nvSpPr>
+        <p:spPr/>
+        <p:txBody>
+          <a:bodyPr/>
+          <a:lstStyle/>
+          <a:p>
+            <a:r>
+              <a:rPr lang="en-US" dirty="0"/>
+              <a:t>Current Goals:</a:t>
+            </a:r>
+          </a:p>
+        </p:txBody>
+      </p:sp>
+      <p:sp>
+        <p:nvSpPr>
+          <p:cNvPr id="3" name="Content Placeholder 2">
+            <a:extLst>
+              <a:ext uri="{FF2B5EF4-FFF2-40B4-BE49-F238E27FC236}">
+                <a16:creationId xmlns:a16="http://schemas.microsoft.com/office/drawing/2014/main" id="{999BE79A-CF73-2D84-A202-9D50D6A5EEA8}"/>
+              </a:ext>
+            </a:extLst>
+          </p:cNvPr>
+          <p:cNvSpPr>
+            <a:spLocks noGrp="1"/>
+          </p:cNvSpPr>
+          <p:nvPr>
+            <p:ph idx="1"/>
+          </p:nvPr>
+        </p:nvSpPr>
+        <p:spPr/>
+        <p:txBody>
+          <a:bodyPr/>
+          <a:lstStyle/>
+          <a:p>
+            <a:r>
+              <a:rPr lang="en-US" dirty="0"/>
+              <a:t>Efficiently create and export Functional Mockup Units (FMU)</a:t>
+            </a:r>
+          </a:p>
+          <a:p>
+            <a:r>
+              <a:rPr lang="en-US" dirty="0"/>
+              <a:t>Programmatically customize the physical parameters of the system model to impact the outputs</a:t>
+            </a:r>
+          </a:p>
+          <a:p>
+            <a:r>
+              <a:rPr lang="en-US" dirty="0"/>
+              <a:t>Use </a:t>
+            </a:r>
+            <a:r>
+              <a:rPr lang="en-US" dirty="0" err="1"/>
+              <a:t>FMPy</a:t>
+            </a:r>
+            <a:r>
+              <a:rPr lang="en-US" dirty="0"/>
+              <a:t> as a Functional Mockup Interface (FMI) to programmatically alter and examine our system model</a:t>
+            </a:r>
+          </a:p>
+          <a:p>
+            <a:r>
+              <a:rPr lang="en-US" dirty="0"/>
+              <a:t>Future work: Upload FMU to microcontroller to make use of our generated and customized ‘digital twin’ to accurately predict behavior of the system.</a:t>
+            </a:r>
+          </a:p>
+        </p:txBody>
+      </p:sp>
+    </p:spTree>
+    <p:extLst>
+      <p:ext uri="{BB962C8B-B14F-4D97-AF65-F5344CB8AC3E}">
+        <p14:creationId xmlns:p14="http://schemas.microsoft.com/office/powerpoint/2010/main" val="3151921195"/>
+      </p:ext>
+    </p:extLst>
+  </p:cSld>
+  <p:clrMapOvr>
+    <a:masterClrMapping/>
+  </p:clrMapOvr>
+</p:sld>
+</file>
+
+<file path=ppt/slides/slide20.xml><?xml version="1.0" encoding="utf-8"?>
 <p:sld xmlns:a="http://schemas.openxmlformats.org/drawingml/2006/main" xmlns:r="http://schemas.openxmlformats.org/officeDocument/2006/relationships" xmlns:p="http://schemas.openxmlformats.org/presentationml/2006/main">
   <p:cSld>
     <p:spTree>
@@ -3772,7 +4536,7 @@
 </p:sld>
 </file>
 
-<file path=ppt/slides/slide2.xml><?xml version="1.0" encoding="utf-8"?>
+<file path=ppt/slides/slide21.xml><?xml version="1.0" encoding="utf-8"?>
 <p:sld xmlns:a="http://schemas.openxmlformats.org/drawingml/2006/main" xmlns:r="http://schemas.openxmlformats.org/officeDocument/2006/relationships" xmlns:p="http://schemas.openxmlformats.org/presentationml/2006/main">
   <p:cSld>
     <p:spTree>
@@ -3794,7 +4558,7 @@
           <p:cNvPr id="2" name="Title 1">
             <a:extLst>
               <a:ext uri="{FF2B5EF4-FFF2-40B4-BE49-F238E27FC236}">
-                <a16:creationId xmlns:a16="http://schemas.microsoft.com/office/drawing/2014/main" id="{31113DE3-AA41-9E16-3216-84DD3E9A63B7}"/>
+                <a16:creationId xmlns:a16="http://schemas.microsoft.com/office/drawing/2014/main" id="{64B94B4F-E848-AA95-6F51-42E4A30B5C58}"/>
               </a:ext>
             </a:extLst>
           </p:cNvPr>
@@ -3812,7 +4576,7 @@
           <a:p>
             <a:r>
               <a:rPr lang="en-US" dirty="0"/>
-              <a:t>Current Goals:</a:t>
+              <a:t>Challenges faced:</a:t>
             </a:r>
           </a:p>
         </p:txBody>
@@ -3822,7 +4586,7 @@
           <p:cNvPr id="3" name="Content Placeholder 2">
             <a:extLst>
               <a:ext uri="{FF2B5EF4-FFF2-40B4-BE49-F238E27FC236}">
-                <a16:creationId xmlns:a16="http://schemas.microsoft.com/office/drawing/2014/main" id="{999BE79A-CF73-2D84-A202-9D50D6A5EEA8}"/>
+                <a16:creationId xmlns:a16="http://schemas.microsoft.com/office/drawing/2014/main" id="{54D9AADE-F390-16BA-C2AB-6B8E279C9B6F}"/>
               </a:ext>
             </a:extLst>
           </p:cNvPr>
@@ -3840,57 +4604,19 @@
           <a:p>
             <a:r>
               <a:rPr lang="en-US" dirty="0"/>
-              <a:t>Efficiently create and export Functional Mockup Units (FMU)</a:t>
+              <a:t>Gaining an understanding of the data structure of the FMU and their  associated .xml files was a challenge, but was instrumental in learning how to programmatically change the variables within</a:t>
             </a:r>
           </a:p>
           <a:p>
             <a:r>
               <a:rPr lang="en-US" dirty="0"/>
-              <a:t>Programmatically </a:t>
-            </a:r>
-            <a:r>
-              <a:rPr lang="en-US" dirty="0" err="1"/>
-              <a:t>customise</a:t>
-            </a:r>
+              <a:t>Sometimes the solver step size does not match the step size it is instructed to use within the code, and this caused errors</a:t>
+            </a:r>
+          </a:p>
+          <a:p>
             <a:r>
               <a:rPr lang="en-US" dirty="0"/>
-              <a:t> the physical parameters of the system model to impact the outputs</a:t>
-            </a:r>
-          </a:p>
-          <a:p>
-            <a:r>
-              <a:rPr lang="en-US" dirty="0"/>
-              <a:t>Use </a:t>
-            </a:r>
-            <a:r>
-              <a:rPr lang="en-US" dirty="0" err="1"/>
-              <a:t>FMPy</a:t>
-            </a:r>
-            <a:r>
-              <a:rPr lang="en-US" dirty="0"/>
-              <a:t> as a Functional Mockup Interface (FMI) to programmatically alter and examine our system model</a:t>
-            </a:r>
-          </a:p>
-          <a:p>
-            <a:r>
-              <a:rPr lang="en-US" dirty="0"/>
-              <a:t>Future work: Upload FMU to microcontroller to make use of our generated and </a:t>
-            </a:r>
-            <a:r>
-              <a:rPr lang="en-US" dirty="0" err="1"/>
-              <a:t>customised</a:t>
-            </a:r>
-            <a:r>
-              <a:rPr lang="en-US" dirty="0"/>
-              <a:t> ‘digital twin’ to predict </a:t>
-            </a:r>
-            <a:r>
-              <a:rPr lang="en-US" dirty="0" err="1"/>
-              <a:t>behaviour</a:t>
-            </a:r>
-            <a:r>
-              <a:rPr lang="en-US" dirty="0"/>
-              <a:t> of the system.</a:t>
+              <a:t>The custom input did not work with the original model, likely due to an error in the setup of the model before it was exported. This was fixed through a simple recreation of the model</a:t>
             </a:r>
           </a:p>
         </p:txBody>
@@ -3898,7 +4624,197 @@
     </p:spTree>
     <p:extLst>
       <p:ext uri="{BB962C8B-B14F-4D97-AF65-F5344CB8AC3E}">
-        <p14:creationId xmlns:p14="http://schemas.microsoft.com/office/powerpoint/2010/main" val="3151921195"/>
+        <p14:creationId xmlns:p14="http://schemas.microsoft.com/office/powerpoint/2010/main" val="1673459258"/>
+      </p:ext>
+    </p:extLst>
+  </p:cSld>
+  <p:clrMapOvr>
+    <a:masterClrMapping/>
+  </p:clrMapOvr>
+</p:sld>
+</file>
+
+<file path=ppt/slides/slide22.xml><?xml version="1.0" encoding="utf-8"?>
+<p:sld xmlns:a="http://schemas.openxmlformats.org/drawingml/2006/main" xmlns:r="http://schemas.openxmlformats.org/officeDocument/2006/relationships" xmlns:p="http://schemas.openxmlformats.org/presentationml/2006/main">
+  <p:cSld>
+    <p:spTree>
+      <p:nvGrpSpPr>
+        <p:cNvPr id="1" name=""/>
+        <p:cNvGrpSpPr/>
+        <p:nvPr/>
+      </p:nvGrpSpPr>
+      <p:grpSpPr>
+        <a:xfrm>
+          <a:off x="0" y="0"/>
+          <a:ext cx="0" cy="0"/>
+          <a:chOff x="0" y="0"/>
+          <a:chExt cx="0" cy="0"/>
+        </a:xfrm>
+      </p:grpSpPr>
+      <p:sp>
+        <p:nvSpPr>
+          <p:cNvPr id="2" name="Title 1">
+            <a:extLst>
+              <a:ext uri="{FF2B5EF4-FFF2-40B4-BE49-F238E27FC236}">
+                <a16:creationId xmlns:a16="http://schemas.microsoft.com/office/drawing/2014/main" id="{3E5B235D-B7AA-5DBB-028D-5EF37EC712BF}"/>
+              </a:ext>
+            </a:extLst>
+          </p:cNvPr>
+          <p:cNvSpPr>
+            <a:spLocks noGrp="1"/>
+          </p:cNvSpPr>
+          <p:nvPr>
+            <p:ph type="title"/>
+          </p:nvPr>
+        </p:nvSpPr>
+        <p:spPr/>
+        <p:txBody>
+          <a:bodyPr/>
+          <a:lstStyle/>
+          <a:p>
+            <a:r>
+              <a:rPr lang="en-US" dirty="0"/>
+              <a:t>Future work:</a:t>
+            </a:r>
+          </a:p>
+        </p:txBody>
+      </p:sp>
+      <p:sp>
+        <p:nvSpPr>
+          <p:cNvPr id="3" name="Content Placeholder 2">
+            <a:extLst>
+              <a:ext uri="{FF2B5EF4-FFF2-40B4-BE49-F238E27FC236}">
+                <a16:creationId xmlns:a16="http://schemas.microsoft.com/office/drawing/2014/main" id="{D5B78C80-5E5C-DC74-23F1-62436891ECEE}"/>
+              </a:ext>
+            </a:extLst>
+          </p:cNvPr>
+          <p:cNvSpPr>
+            <a:spLocks noGrp="1"/>
+          </p:cNvSpPr>
+          <p:nvPr>
+            <p:ph idx="1"/>
+          </p:nvPr>
+        </p:nvSpPr>
+        <p:spPr/>
+        <p:txBody>
+          <a:bodyPr>
+            <a:normAutofit lnSpcReduction="10000"/>
+          </a:bodyPr>
+          <a:lstStyle/>
+          <a:p>
+            <a:r>
+              <a:rPr lang="en-US" sz="3200" dirty="0"/>
+              <a:t>Shift towards the usage of Model Exchange interface type in order to implement encryption</a:t>
+            </a:r>
+          </a:p>
+          <a:p>
+            <a:r>
+              <a:rPr lang="en-US" sz="3200" dirty="0"/>
+              <a:t>Implement encryption/encrypted solver into the code – specifically within the ‘simulation loop’ segment of our code</a:t>
+            </a:r>
+          </a:p>
+          <a:p>
+            <a:r>
+              <a:rPr lang="en-US" sz="3200" dirty="0"/>
+              <a:t>Use the encrypted system and solver to securely simulate our system</a:t>
+            </a:r>
+          </a:p>
+          <a:p>
+            <a:r>
+              <a:rPr lang="en-US" sz="3200" dirty="0"/>
+              <a:t>Implement our code in a microcontroller to use our ‘digital twin’ in real time using the ‘create </a:t>
+            </a:r>
+            <a:r>
+              <a:rPr lang="en-US" sz="3200" dirty="0" err="1"/>
+              <a:t>cmake</a:t>
+            </a:r>
+            <a:r>
+              <a:rPr lang="en-US" sz="3200" dirty="0"/>
+              <a:t> project’ function of </a:t>
+            </a:r>
+            <a:r>
+              <a:rPr lang="en-US" sz="3200" dirty="0" err="1"/>
+              <a:t>FMPy</a:t>
+            </a:r>
+            <a:r>
+              <a:rPr lang="en-US" sz="3200" dirty="0"/>
+              <a:t> on our model.</a:t>
+            </a:r>
+          </a:p>
+          <a:p>
+            <a:endParaRPr lang="en-US" dirty="0"/>
+          </a:p>
+        </p:txBody>
+      </p:sp>
+    </p:spTree>
+    <p:extLst>
+      <p:ext uri="{BB962C8B-B14F-4D97-AF65-F5344CB8AC3E}">
+        <p14:creationId xmlns:p14="http://schemas.microsoft.com/office/powerpoint/2010/main" val="2099133404"/>
+      </p:ext>
+    </p:extLst>
+  </p:cSld>
+  <p:clrMapOvr>
+    <a:masterClrMapping/>
+  </p:clrMapOvr>
+</p:sld>
+</file>
+
+<file path=ppt/slides/slide23.xml><?xml version="1.0" encoding="utf-8"?>
+<p:sld xmlns:a="http://schemas.openxmlformats.org/drawingml/2006/main" xmlns:r="http://schemas.openxmlformats.org/officeDocument/2006/relationships" xmlns:p="http://schemas.openxmlformats.org/presentationml/2006/main">
+  <p:cSld>
+    <p:spTree>
+      <p:nvGrpSpPr>
+        <p:cNvPr id="1" name=""/>
+        <p:cNvGrpSpPr/>
+        <p:nvPr/>
+      </p:nvGrpSpPr>
+      <p:grpSpPr>
+        <a:xfrm>
+          <a:off x="0" y="0"/>
+          <a:ext cx="0" cy="0"/>
+          <a:chOff x="0" y="0"/>
+          <a:chExt cx="0" cy="0"/>
+        </a:xfrm>
+      </p:grpSpPr>
+      <p:sp>
+        <p:nvSpPr>
+          <p:cNvPr id="2" name="Title 1">
+            <a:extLst>
+              <a:ext uri="{FF2B5EF4-FFF2-40B4-BE49-F238E27FC236}">
+                <a16:creationId xmlns:a16="http://schemas.microsoft.com/office/drawing/2014/main" id="{BAFE07D5-B7F2-B95E-D9A9-4D6D50ACCAB1}"/>
+              </a:ext>
+            </a:extLst>
+          </p:cNvPr>
+          <p:cNvSpPr>
+            <a:spLocks noGrp="1"/>
+          </p:cNvSpPr>
+          <p:nvPr>
+            <p:ph type="title"/>
+          </p:nvPr>
+        </p:nvSpPr>
+        <p:spPr>
+          <a:xfrm>
+            <a:off x="4002719" y="2850873"/>
+            <a:ext cx="4186561" cy="1325563"/>
+          </a:xfrm>
+        </p:spPr>
+        <p:txBody>
+          <a:bodyPr>
+            <a:normAutofit/>
+          </a:bodyPr>
+          <a:lstStyle/>
+          <a:p>
+            <a:r>
+              <a:rPr lang="en-US" sz="6600" dirty="0"/>
+              <a:t>Questions?</a:t>
+            </a:r>
+          </a:p>
+        </p:txBody>
+      </p:sp>
+    </p:spTree>
+    <p:extLst>
+      <p:ext uri="{BB962C8B-B14F-4D97-AF65-F5344CB8AC3E}">
+        <p14:creationId xmlns:p14="http://schemas.microsoft.com/office/powerpoint/2010/main" val="729038143"/>
       </p:ext>
     </p:extLst>
   </p:cSld>
@@ -4039,7 +4955,32 @@
             </a:r>
           </a:p>
           <a:p>
-            <a:endParaRPr lang="en-US" sz="2000" dirty="0"/>
+            <a:r>
+              <a:rPr lang="en-US" sz="2000" dirty="0"/>
+              <a:t>We are currently using </a:t>
+            </a:r>
+            <a:r>
+              <a:rPr lang="en-US" sz="2000" dirty="0" err="1"/>
+              <a:t>cosimulation</a:t>
+            </a:r>
+            <a:r>
+              <a:rPr lang="en-US" sz="2000" dirty="0"/>
+              <a:t>, but aim to move towards model </a:t>
+            </a:r>
+            <a:br>
+              <a:rPr lang="en-US" sz="2000" dirty="0"/>
+            </a:br>
+            <a:r>
+              <a:rPr lang="en-US" sz="2000" dirty="0"/>
+              <a:t>exchange in the future, which would allow us to implement our own </a:t>
+            </a:r>
+            <a:br>
+              <a:rPr lang="en-US" sz="2000" dirty="0"/>
+            </a:br>
+            <a:r>
+              <a:rPr lang="en-US" sz="2000" dirty="0"/>
+              <a:t>custom solver</a:t>
+            </a:r>
           </a:p>
         </p:txBody>
       </p:sp>
@@ -4087,7 +5028,7 @@
         </p:nvSpPr>
         <p:spPr>
           <a:xfrm>
-            <a:off x="5061796" y="4723093"/>
+            <a:off x="6135420" y="5587451"/>
             <a:ext cx="3290048" cy="1200329"/>
           </a:xfrm>
           <a:prstGeom prst="rect">
@@ -4121,51 +5062,6 @@
           </a:p>
         </p:txBody>
       </p:sp>
-      <p:cxnSp>
-        <p:nvCxnSpPr>
-          <p:cNvPr id="15" name="Connector: Elbow 14">
-            <a:extLst>
-              <a:ext uri="{FF2B5EF4-FFF2-40B4-BE49-F238E27FC236}">
-                <a16:creationId xmlns:a16="http://schemas.microsoft.com/office/drawing/2014/main" id="{2D8CAB8D-C15C-BE92-B3BB-7EC0190B869C}"/>
-              </a:ext>
-            </a:extLst>
-          </p:cNvPr>
-          <p:cNvCxnSpPr>
-            <a:cxnSpLocks/>
-            <a:stCxn id="13" idx="2"/>
-          </p:cNvCxnSpPr>
-          <p:nvPr/>
-        </p:nvCxnSpPr>
-        <p:spPr>
-          <a:xfrm rot="16200000" flipH="1">
-            <a:off x="7956210" y="4674031"/>
-            <a:ext cx="178097" cy="2676877"/>
-          </a:xfrm>
-          <a:prstGeom prst="bentConnector2">
-            <a:avLst/>
-          </a:prstGeom>
-          <a:ln>
-            <a:solidFill>
-              <a:srgbClr val="FF0000"/>
-            </a:solidFill>
-            <a:tailEnd type="triangle"/>
-          </a:ln>
-        </p:spPr>
-        <p:style>
-          <a:lnRef idx="3">
-            <a:schemeClr val="accent2"/>
-          </a:lnRef>
-          <a:fillRef idx="0">
-            <a:schemeClr val="accent2"/>
-          </a:fillRef>
-          <a:effectRef idx="2">
-            <a:schemeClr val="accent2"/>
-          </a:effectRef>
-          <a:fontRef idx="minor">
-            <a:schemeClr val="tx1"/>
-          </a:fontRef>
-        </p:style>
-      </p:cxnSp>
     </p:spTree>
     <p:extLst>
       <p:ext uri="{BB962C8B-B14F-4D97-AF65-F5344CB8AC3E}">
@@ -4201,6 +5097,297 @@
           <p:cNvPr id="2" name="Title 1">
             <a:extLst>
               <a:ext uri="{FF2B5EF4-FFF2-40B4-BE49-F238E27FC236}">
+                <a16:creationId xmlns:a16="http://schemas.microsoft.com/office/drawing/2014/main" id="{C58036BB-D19F-B8BC-3B98-3713B837842D}"/>
+              </a:ext>
+            </a:extLst>
+          </p:cNvPr>
+          <p:cNvSpPr>
+            <a:spLocks noGrp="1"/>
+          </p:cNvSpPr>
+          <p:nvPr>
+            <p:ph type="title"/>
+          </p:nvPr>
+        </p:nvSpPr>
+        <p:spPr/>
+        <p:txBody>
+          <a:bodyPr/>
+          <a:lstStyle/>
+          <a:p>
+            <a:r>
+              <a:rPr lang="en-US" dirty="0"/>
+              <a:t>Co-Simulation vs. Model Exchange</a:t>
+            </a:r>
+          </a:p>
+        </p:txBody>
+      </p:sp>
+      <p:pic>
+        <p:nvPicPr>
+          <p:cNvPr id="5" name="Content Placeholder 4">
+            <a:extLst>
+              <a:ext uri="{FF2B5EF4-FFF2-40B4-BE49-F238E27FC236}">
+                <a16:creationId xmlns:a16="http://schemas.microsoft.com/office/drawing/2014/main" id="{14BE5653-306B-0ABD-C3EE-C01A6A9EB7BD}"/>
+              </a:ext>
+            </a:extLst>
+          </p:cNvPr>
+          <p:cNvPicPr>
+            <a:picLocks noGrp="1" noChangeAspect="1"/>
+          </p:cNvPicPr>
+          <p:nvPr>
+            <p:ph idx="1"/>
+          </p:nvPr>
+        </p:nvPicPr>
+        <p:blipFill>
+          <a:blip r:embed="rId2"/>
+          <a:stretch>
+            <a:fillRect/>
+          </a:stretch>
+        </p:blipFill>
+        <p:spPr>
+          <a:xfrm>
+            <a:off x="6269879" y="1453743"/>
+            <a:ext cx="5492447" cy="4763564"/>
+          </a:xfrm>
+        </p:spPr>
+      </p:pic>
+      <p:pic>
+        <p:nvPicPr>
+          <p:cNvPr id="6" name="Picture 5">
+            <a:extLst>
+              <a:ext uri="{FF2B5EF4-FFF2-40B4-BE49-F238E27FC236}">
+                <a16:creationId xmlns:a16="http://schemas.microsoft.com/office/drawing/2014/main" id="{C258FFC8-5FB6-2018-946D-D1942775929A}"/>
+              </a:ext>
+            </a:extLst>
+          </p:cNvPr>
+          <p:cNvPicPr>
+            <a:picLocks noChangeAspect="1"/>
+          </p:cNvPicPr>
+          <p:nvPr/>
+        </p:nvPicPr>
+        <p:blipFill>
+          <a:blip r:embed="rId3"/>
+          <a:stretch>
+            <a:fillRect/>
+          </a:stretch>
+        </p:blipFill>
+        <p:spPr>
+          <a:xfrm>
+            <a:off x="1032363" y="1178175"/>
+            <a:ext cx="4317560" cy="5314700"/>
+          </a:xfrm>
+          <a:prstGeom prst="rect">
+            <a:avLst/>
+          </a:prstGeom>
+        </p:spPr>
+      </p:pic>
+    </p:spTree>
+    <p:extLst>
+      <p:ext uri="{BB962C8B-B14F-4D97-AF65-F5344CB8AC3E}">
+        <p14:creationId xmlns:p14="http://schemas.microsoft.com/office/powerpoint/2010/main" val="3800535422"/>
+      </p:ext>
+    </p:extLst>
+  </p:cSld>
+  <p:clrMapOvr>
+    <a:masterClrMapping/>
+  </p:clrMapOvr>
+</p:sld>
+</file>
+
+<file path=ppt/slides/slide5.xml><?xml version="1.0" encoding="utf-8"?>
+<p:sld xmlns:a="http://schemas.openxmlformats.org/drawingml/2006/main" xmlns:r="http://schemas.openxmlformats.org/officeDocument/2006/relationships" xmlns:p="http://schemas.openxmlformats.org/presentationml/2006/main">
+  <p:cSld>
+    <p:spTree>
+      <p:nvGrpSpPr>
+        <p:cNvPr id="1" name=""/>
+        <p:cNvGrpSpPr/>
+        <p:nvPr/>
+      </p:nvGrpSpPr>
+      <p:grpSpPr>
+        <a:xfrm>
+          <a:off x="0" y="0"/>
+          <a:ext cx="0" cy="0"/>
+          <a:chOff x="0" y="0"/>
+          <a:chExt cx="0" cy="0"/>
+        </a:xfrm>
+      </p:grpSpPr>
+      <p:sp>
+        <p:nvSpPr>
+          <p:cNvPr id="2" name="Title 1">
+            <a:extLst>
+              <a:ext uri="{FF2B5EF4-FFF2-40B4-BE49-F238E27FC236}">
+                <a16:creationId xmlns:a16="http://schemas.microsoft.com/office/drawing/2014/main" id="{6B68C763-C55E-F642-6ABE-D06EC6FD5CA8}"/>
+              </a:ext>
+            </a:extLst>
+          </p:cNvPr>
+          <p:cNvSpPr>
+            <a:spLocks noGrp="1"/>
+          </p:cNvSpPr>
+          <p:nvPr>
+            <p:ph type="title"/>
+          </p:nvPr>
+        </p:nvSpPr>
+        <p:spPr/>
+        <p:txBody>
+          <a:bodyPr/>
+          <a:lstStyle/>
+          <a:p>
+            <a:r>
+              <a:rPr lang="en-US" dirty="0"/>
+              <a:t>What’s inside the FMU?</a:t>
+            </a:r>
+          </a:p>
+        </p:txBody>
+      </p:sp>
+      <p:pic>
+        <p:nvPicPr>
+          <p:cNvPr id="5" name="Content Placeholder 4">
+            <a:extLst>
+              <a:ext uri="{FF2B5EF4-FFF2-40B4-BE49-F238E27FC236}">
+                <a16:creationId xmlns:a16="http://schemas.microsoft.com/office/drawing/2014/main" id="{23F03BB3-4908-4924-6976-3B6ADA6FD7B0}"/>
+              </a:ext>
+            </a:extLst>
+          </p:cNvPr>
+          <p:cNvPicPr>
+            <a:picLocks noGrp="1" noChangeAspect="1"/>
+          </p:cNvPicPr>
+          <p:nvPr>
+            <p:ph idx="1"/>
+          </p:nvPr>
+        </p:nvPicPr>
+        <p:blipFill>
+          <a:blip r:embed="rId2"/>
+          <a:stretch>
+            <a:fillRect/>
+          </a:stretch>
+        </p:blipFill>
+        <p:spPr>
+          <a:xfrm>
+            <a:off x="218719" y="1483057"/>
+            <a:ext cx="9755803" cy="3243618"/>
+          </a:xfrm>
+        </p:spPr>
+      </p:pic>
+    </p:spTree>
+    <p:extLst>
+      <p:ext uri="{BB962C8B-B14F-4D97-AF65-F5344CB8AC3E}">
+        <p14:creationId xmlns:p14="http://schemas.microsoft.com/office/powerpoint/2010/main" val="684797452"/>
+      </p:ext>
+    </p:extLst>
+  </p:cSld>
+  <p:clrMapOvr>
+    <a:masterClrMapping/>
+  </p:clrMapOvr>
+</p:sld>
+</file>
+
+<file path=ppt/slides/slide6.xml><?xml version="1.0" encoding="utf-8"?>
+<p:sld xmlns:a="http://schemas.openxmlformats.org/drawingml/2006/main" xmlns:r="http://schemas.openxmlformats.org/officeDocument/2006/relationships" xmlns:p="http://schemas.openxmlformats.org/presentationml/2006/main">
+  <p:cSld>
+    <p:spTree>
+      <p:nvGrpSpPr>
+        <p:cNvPr id="1" name=""/>
+        <p:cNvGrpSpPr/>
+        <p:nvPr/>
+      </p:nvGrpSpPr>
+      <p:grpSpPr>
+        <a:xfrm>
+          <a:off x="0" y="0"/>
+          <a:ext cx="0" cy="0"/>
+          <a:chOff x="0" y="0"/>
+          <a:chExt cx="0" cy="0"/>
+        </a:xfrm>
+      </p:grpSpPr>
+      <p:sp>
+        <p:nvSpPr>
+          <p:cNvPr id="2" name="Title 1">
+            <a:extLst>
+              <a:ext uri="{FF2B5EF4-FFF2-40B4-BE49-F238E27FC236}">
+                <a16:creationId xmlns:a16="http://schemas.microsoft.com/office/drawing/2014/main" id="{2182F237-4959-EC2C-9C84-AE0735C651E1}"/>
+              </a:ext>
+            </a:extLst>
+          </p:cNvPr>
+          <p:cNvSpPr>
+            <a:spLocks noGrp="1"/>
+          </p:cNvSpPr>
+          <p:nvPr>
+            <p:ph type="title"/>
+          </p:nvPr>
+        </p:nvSpPr>
+        <p:spPr/>
+        <p:txBody>
+          <a:bodyPr/>
+          <a:lstStyle/>
+          <a:p>
+            <a:r>
+              <a:rPr lang="en-US" dirty="0"/>
+              <a:t>Within the .xml file</a:t>
+            </a:r>
+          </a:p>
+        </p:txBody>
+      </p:sp>
+      <p:pic>
+        <p:nvPicPr>
+          <p:cNvPr id="5" name="Content Placeholder 4">
+            <a:extLst>
+              <a:ext uri="{FF2B5EF4-FFF2-40B4-BE49-F238E27FC236}">
+                <a16:creationId xmlns:a16="http://schemas.microsoft.com/office/drawing/2014/main" id="{B47F0953-326B-52B0-57FB-6B0513EBBF93}"/>
+              </a:ext>
+            </a:extLst>
+          </p:cNvPr>
+          <p:cNvPicPr>
+            <a:picLocks noGrp="1" noChangeAspect="1"/>
+          </p:cNvPicPr>
+          <p:nvPr>
+            <p:ph idx="1"/>
+          </p:nvPr>
+        </p:nvPicPr>
+        <p:blipFill>
+          <a:blip r:embed="rId2"/>
+          <a:stretch>
+            <a:fillRect/>
+          </a:stretch>
+        </p:blipFill>
+        <p:spPr>
+          <a:xfrm>
+            <a:off x="65368" y="2004609"/>
+            <a:ext cx="10322770" cy="2494603"/>
+          </a:xfrm>
+        </p:spPr>
+      </p:pic>
+    </p:spTree>
+    <p:extLst>
+      <p:ext uri="{BB962C8B-B14F-4D97-AF65-F5344CB8AC3E}">
+        <p14:creationId xmlns:p14="http://schemas.microsoft.com/office/powerpoint/2010/main" val="3884572401"/>
+      </p:ext>
+    </p:extLst>
+  </p:cSld>
+  <p:clrMapOvr>
+    <a:masterClrMapping/>
+  </p:clrMapOvr>
+</p:sld>
+</file>
+
+<file path=ppt/slides/slide7.xml><?xml version="1.0" encoding="utf-8"?>
+<p:sld xmlns:a="http://schemas.openxmlformats.org/drawingml/2006/main" xmlns:r="http://schemas.openxmlformats.org/officeDocument/2006/relationships" xmlns:p="http://schemas.openxmlformats.org/presentationml/2006/main">
+  <p:cSld>
+    <p:spTree>
+      <p:nvGrpSpPr>
+        <p:cNvPr id="1" name=""/>
+        <p:cNvGrpSpPr/>
+        <p:nvPr/>
+      </p:nvGrpSpPr>
+      <p:grpSpPr>
+        <a:xfrm>
+          <a:off x="0" y="0"/>
+          <a:ext cx="0" cy="0"/>
+          <a:chOff x="0" y="0"/>
+          <a:chExt cx="0" cy="0"/>
+        </a:xfrm>
+      </p:grpSpPr>
+      <p:sp>
+        <p:nvSpPr>
+          <p:cNvPr id="2" name="Title 1">
+            <a:extLst>
+              <a:ext uri="{FF2B5EF4-FFF2-40B4-BE49-F238E27FC236}">
                 <a16:creationId xmlns:a16="http://schemas.microsoft.com/office/drawing/2014/main" id="{55128381-D8B5-B6CB-D3E2-AAD59677F284}"/>
               </a:ext>
             </a:extLst>
@@ -4259,19 +5446,33 @@
             </a:r>
             <a:r>
               <a:rPr lang="en-US" dirty="0"/>
-              <a:t>, a python library for interpreting and simulating FMU, was used to open a GUI where some, but not all parameters could be altered</a:t>
+              <a:t>, a python library for interpreting and simulating FMU, was used to open a GUI where some, but not all parameters could be altered quickly, but temporarily</a:t>
             </a:r>
           </a:p>
           <a:p>
             <a:r>
               <a:rPr lang="en-US" dirty="0"/>
-              <a:t>While this was a quick and easy method to change certain parameters, it was much less consistent and gave much less control than programmatically altering the models.</a:t>
+              <a:t>While this was a quick and easy method to change certain parameters, it was much less consistent and gave much less control than programmatically altering the values when simulating.</a:t>
             </a:r>
           </a:p>
           <a:p>
             <a:r>
               <a:rPr lang="en-US" dirty="0"/>
-              <a:t>Now, we are using </a:t>
+              <a:t>The </a:t>
+            </a:r>
+            <a:r>
+              <a:rPr lang="en-US" dirty="0" err="1"/>
+              <a:t>gui</a:t>
+            </a:r>
+            <a:r>
+              <a:rPr lang="en-US" dirty="0"/>
+              <a:t> gave us less flexibility with controlling the system, and we want full control</a:t>
+            </a:r>
+          </a:p>
+          <a:p>
+            <a:r>
+              <a:rPr lang="en-US" dirty="0"/>
+              <a:t>Currently, we are using </a:t>
             </a:r>
             <a:r>
               <a:rPr lang="en-US" dirty="0" err="1"/>
@@ -4281,6 +5482,9 @@
               <a:rPr lang="en-US" dirty="0"/>
               <a:t> programmatically to alter the physical parameters within the system.</a:t>
             </a:r>
+          </a:p>
+          <a:p>
+            <a:endParaRPr lang="en-US" dirty="0"/>
           </a:p>
         </p:txBody>
       </p:sp>
@@ -4297,7 +5501,7 @@
 </p:sld>
 </file>
 
-<file path=ppt/slides/slide5.xml><?xml version="1.0" encoding="utf-8"?>
+<file path=ppt/slides/slide8.xml><?xml version="1.0" encoding="utf-8"?>
 <p:sld xmlns:a="http://schemas.openxmlformats.org/drawingml/2006/main" xmlns:r="http://schemas.openxmlformats.org/officeDocument/2006/relationships" xmlns:p="http://schemas.openxmlformats.org/presentationml/2006/main">
   <p:cSld>
     <p:spTree>
@@ -4426,288 +5630,6 @@
 </p:sld>
 </file>
 
-<file path=ppt/slides/slide6.xml><?xml version="1.0" encoding="utf-8"?>
-<p:sld xmlns:a="http://schemas.openxmlformats.org/drawingml/2006/main" xmlns:r="http://schemas.openxmlformats.org/officeDocument/2006/relationships" xmlns:p="http://schemas.openxmlformats.org/presentationml/2006/main">
-  <p:cSld>
-    <p:spTree>
-      <p:nvGrpSpPr>
-        <p:cNvPr id="1" name=""/>
-        <p:cNvGrpSpPr/>
-        <p:nvPr/>
-      </p:nvGrpSpPr>
-      <p:grpSpPr>
-        <a:xfrm>
-          <a:off x="0" y="0"/>
-          <a:ext cx="0" cy="0"/>
-          <a:chOff x="0" y="0"/>
-          <a:chExt cx="0" cy="0"/>
-        </a:xfrm>
-      </p:grpSpPr>
-      <p:sp>
-        <p:nvSpPr>
-          <p:cNvPr id="2" name="Title 1">
-            <a:extLst>
-              <a:ext uri="{FF2B5EF4-FFF2-40B4-BE49-F238E27FC236}">
-                <a16:creationId xmlns:a16="http://schemas.microsoft.com/office/drawing/2014/main" id="{305064E6-1E3C-D652-74CA-46CD9B71DBB7}"/>
-              </a:ext>
-            </a:extLst>
-          </p:cNvPr>
-          <p:cNvSpPr>
-            <a:spLocks noGrp="1"/>
-          </p:cNvSpPr>
-          <p:nvPr>
-            <p:ph type="title"/>
-          </p:nvPr>
-        </p:nvSpPr>
-        <p:spPr/>
-        <p:txBody>
-          <a:bodyPr/>
-          <a:lstStyle/>
-          <a:p>
-            <a:r>
-              <a:rPr lang="en-US" dirty="0"/>
-              <a:t>New Model to test for multiple outputs </a:t>
-            </a:r>
-          </a:p>
-        </p:txBody>
-      </p:sp>
-      <p:pic>
-        <p:nvPicPr>
-          <p:cNvPr id="6" name="Content Placeholder 5" descr="A diagram of a mathematical equation&#10;&#10;Description automatically generated">
-            <a:extLst>
-              <a:ext uri="{FF2B5EF4-FFF2-40B4-BE49-F238E27FC236}">
-                <a16:creationId xmlns:a16="http://schemas.microsoft.com/office/drawing/2014/main" id="{3F47BC64-785C-0C1E-3ECE-502509F5FAA2}"/>
-              </a:ext>
-            </a:extLst>
-          </p:cNvPr>
-          <p:cNvPicPr>
-            <a:picLocks noGrp="1" noChangeAspect="1"/>
-          </p:cNvPicPr>
-          <p:nvPr>
-            <p:ph idx="1"/>
-          </p:nvPr>
-        </p:nvPicPr>
-        <p:blipFill>
-          <a:blip r:embed="rId2">
-            <a:extLst>
-              <a:ext uri="{28A0092B-C50C-407E-A947-70E740481C1C}">
-                <a14:useLocalDpi xmlns:a14="http://schemas.microsoft.com/office/drawing/2010/main" val="0"/>
-              </a:ext>
-            </a:extLst>
-          </a:blip>
-          <a:stretch>
-            <a:fillRect/>
-          </a:stretch>
-        </p:blipFill>
-        <p:spPr>
-          <a:xfrm>
-            <a:off x="4190105" y="1880767"/>
-            <a:ext cx="8001896" cy="4893246"/>
-          </a:xfrm>
-        </p:spPr>
-      </p:pic>
-    </p:spTree>
-    <p:extLst>
-      <p:ext uri="{BB962C8B-B14F-4D97-AF65-F5344CB8AC3E}">
-        <p14:creationId xmlns:p14="http://schemas.microsoft.com/office/powerpoint/2010/main" val="1780559682"/>
-      </p:ext>
-    </p:extLst>
-  </p:cSld>
-  <p:clrMapOvr>
-    <a:masterClrMapping/>
-  </p:clrMapOvr>
-</p:sld>
-</file>
-
-<file path=ppt/slides/slide7.xml><?xml version="1.0" encoding="utf-8"?>
-<p:sld xmlns:a="http://schemas.openxmlformats.org/drawingml/2006/main" xmlns:r="http://schemas.openxmlformats.org/officeDocument/2006/relationships" xmlns:p="http://schemas.openxmlformats.org/presentationml/2006/main">
-  <p:cSld>
-    <p:spTree>
-      <p:nvGrpSpPr>
-        <p:cNvPr id="1" name=""/>
-        <p:cNvGrpSpPr/>
-        <p:nvPr/>
-      </p:nvGrpSpPr>
-      <p:grpSpPr>
-        <a:xfrm>
-          <a:off x="0" y="0"/>
-          <a:ext cx="0" cy="0"/>
-          <a:chOff x="0" y="0"/>
-          <a:chExt cx="0" cy="0"/>
-        </a:xfrm>
-      </p:grpSpPr>
-      <p:pic>
-        <p:nvPicPr>
-          <p:cNvPr id="5" name="Content Placeholder 4">
-            <a:extLst>
-              <a:ext uri="{FF2B5EF4-FFF2-40B4-BE49-F238E27FC236}">
-                <a16:creationId xmlns:a16="http://schemas.microsoft.com/office/drawing/2014/main" id="{07C9CD3D-28B3-6FCE-DACF-465354BED401}"/>
-              </a:ext>
-            </a:extLst>
-          </p:cNvPr>
-          <p:cNvPicPr>
-            <a:picLocks noGrp="1" noChangeAspect="1"/>
-          </p:cNvPicPr>
-          <p:nvPr>
-            <p:ph idx="1"/>
-          </p:nvPr>
-        </p:nvPicPr>
-        <p:blipFill>
-          <a:blip r:embed="rId2"/>
-          <a:stretch>
-            <a:fillRect/>
-          </a:stretch>
-        </p:blipFill>
-        <p:spPr>
-          <a:xfrm>
-            <a:off x="72206" y="55643"/>
-            <a:ext cx="8605140" cy="6553077"/>
-          </a:xfrm>
-        </p:spPr>
-      </p:pic>
-      <p:sp>
-        <p:nvSpPr>
-          <p:cNvPr id="7" name="TextBox 6">
-            <a:extLst>
-              <a:ext uri="{FF2B5EF4-FFF2-40B4-BE49-F238E27FC236}">
-                <a16:creationId xmlns:a16="http://schemas.microsoft.com/office/drawing/2014/main" id="{0EBBC1A2-70D7-0CEA-4D7B-9010CC4348E8}"/>
-              </a:ext>
-            </a:extLst>
-          </p:cNvPr>
-          <p:cNvSpPr txBox="1"/>
-          <p:nvPr/>
-        </p:nvSpPr>
-        <p:spPr>
-          <a:xfrm>
-            <a:off x="8915319" y="5803752"/>
-            <a:ext cx="3204475" cy="954107"/>
-          </a:xfrm>
-          <a:prstGeom prst="rect">
-            <a:avLst/>
-          </a:prstGeom>
-          <a:noFill/>
-        </p:spPr>
-        <p:txBody>
-          <a:bodyPr wrap="square" rtlCol="0">
-            <a:spAutoFit/>
-          </a:bodyPr>
-          <a:lstStyle/>
-          <a:p>
-            <a:r>
-              <a:rPr lang="en-US" sz="2800" dirty="0"/>
-              <a:t>Simulink model of 2MSD</a:t>
-            </a:r>
-          </a:p>
-        </p:txBody>
-      </p:sp>
-    </p:spTree>
-    <p:extLst>
-      <p:ext uri="{BB962C8B-B14F-4D97-AF65-F5344CB8AC3E}">
-        <p14:creationId xmlns:p14="http://schemas.microsoft.com/office/powerpoint/2010/main" val="3506511005"/>
-      </p:ext>
-    </p:extLst>
-  </p:cSld>
-  <p:clrMapOvr>
-    <a:masterClrMapping/>
-  </p:clrMapOvr>
-</p:sld>
-</file>
-
-<file path=ppt/slides/slide8.xml><?xml version="1.0" encoding="utf-8"?>
-<p:sld xmlns:a="http://schemas.openxmlformats.org/drawingml/2006/main" xmlns:r="http://schemas.openxmlformats.org/officeDocument/2006/relationships" xmlns:p="http://schemas.openxmlformats.org/presentationml/2006/main">
-  <p:cSld>
-    <p:spTree>
-      <p:nvGrpSpPr>
-        <p:cNvPr id="1" name=""/>
-        <p:cNvGrpSpPr/>
-        <p:nvPr/>
-      </p:nvGrpSpPr>
-      <p:grpSpPr>
-        <a:xfrm>
-          <a:off x="0" y="0"/>
-          <a:ext cx="0" cy="0"/>
-          <a:chOff x="0" y="0"/>
-          <a:chExt cx="0" cy="0"/>
-        </a:xfrm>
-      </p:grpSpPr>
-      <p:sp>
-        <p:nvSpPr>
-          <p:cNvPr id="2" name="Title 1">
-            <a:extLst>
-              <a:ext uri="{FF2B5EF4-FFF2-40B4-BE49-F238E27FC236}">
-                <a16:creationId xmlns:a16="http://schemas.microsoft.com/office/drawing/2014/main" id="{A962EF12-A15C-8C57-5D8B-FBD099D18524}"/>
-              </a:ext>
-            </a:extLst>
-          </p:cNvPr>
-          <p:cNvSpPr>
-            <a:spLocks noGrp="1"/>
-          </p:cNvSpPr>
-          <p:nvPr>
-            <p:ph type="title"/>
-          </p:nvPr>
-        </p:nvSpPr>
-        <p:spPr/>
-        <p:txBody>
-          <a:bodyPr/>
-          <a:lstStyle/>
-          <a:p>
-            <a:r>
-              <a:rPr lang="en-US" dirty="0"/>
-              <a:t>Using custom inputs in </a:t>
-            </a:r>
-            <a:r>
-              <a:rPr lang="en-US" dirty="0" err="1"/>
-              <a:t>FMPy</a:t>
-            </a:r>
-            <a:r>
-              <a:rPr lang="en-US" dirty="0"/>
-              <a:t>:</a:t>
-            </a:r>
-          </a:p>
-        </p:txBody>
-      </p:sp>
-      <p:pic>
-        <p:nvPicPr>
-          <p:cNvPr id="5" name="Content Placeholder 4">
-            <a:extLst>
-              <a:ext uri="{FF2B5EF4-FFF2-40B4-BE49-F238E27FC236}">
-                <a16:creationId xmlns:a16="http://schemas.microsoft.com/office/drawing/2014/main" id="{B38F6F4A-E1A3-7002-43B4-6073D4201A13}"/>
-              </a:ext>
-            </a:extLst>
-          </p:cNvPr>
-          <p:cNvPicPr>
-            <a:picLocks noGrp="1" noChangeAspect="1"/>
-          </p:cNvPicPr>
-          <p:nvPr>
-            <p:ph idx="1"/>
-          </p:nvPr>
-        </p:nvPicPr>
-        <p:blipFill>
-          <a:blip r:embed="rId2"/>
-          <a:stretch>
-            <a:fillRect/>
-          </a:stretch>
-        </p:blipFill>
-        <p:spPr>
-          <a:xfrm>
-            <a:off x="426720" y="1391908"/>
-            <a:ext cx="11338559" cy="5466092"/>
-          </a:xfrm>
-        </p:spPr>
-      </p:pic>
-    </p:spTree>
-    <p:extLst>
-      <p:ext uri="{BB962C8B-B14F-4D97-AF65-F5344CB8AC3E}">
-        <p14:creationId xmlns:p14="http://schemas.microsoft.com/office/powerpoint/2010/main" val="4225417103"/>
-      </p:ext>
-    </p:extLst>
-  </p:cSld>
-  <p:clrMapOvr>
-    <a:masterClrMapping/>
-  </p:clrMapOvr>
-</p:sld>
-</file>
-
 <file path=ppt/slides/slide9.xml><?xml version="1.0" encoding="utf-8"?>
 <p:sld xmlns:a="http://schemas.openxmlformats.org/drawingml/2006/main" xmlns:r="http://schemas.openxmlformats.org/officeDocument/2006/relationships" xmlns:p="http://schemas.openxmlformats.org/presentationml/2006/main">
   <p:cSld>
@@ -4730,7 +5652,7 @@
           <p:cNvPr id="2" name="Title 1">
             <a:extLst>
               <a:ext uri="{FF2B5EF4-FFF2-40B4-BE49-F238E27FC236}">
-                <a16:creationId xmlns:a16="http://schemas.microsoft.com/office/drawing/2014/main" id="{8F488DB1-7A35-C8AF-336D-A431D69DDD7C}"/>
+                <a16:creationId xmlns:a16="http://schemas.microsoft.com/office/drawing/2014/main" id="{DBCA707E-29A9-2B63-33F7-6BC851EC617D}"/>
               </a:ext>
             </a:extLst>
           </p:cNvPr>
@@ -4747,22 +5669,18 @@
           <a:lstStyle/>
           <a:p>
             <a:r>
-              <a:rPr lang="en-US" dirty="0" err="1"/>
-              <a:t>ScalarVariable</a:t>
-            </a:r>
-            <a:r>
               <a:rPr lang="en-US" dirty="0"/>
-              <a:t> within the FMU 	</a:t>
+              <a:t>Model 1 Custom Parameters	</a:t>
             </a:r>
           </a:p>
         </p:txBody>
       </p:sp>
       <p:pic>
         <p:nvPicPr>
-          <p:cNvPr id="4" name="Content Placeholder 3">
-            <a:extLst>
-              <a:ext uri="{FF2B5EF4-FFF2-40B4-BE49-F238E27FC236}">
-                <a16:creationId xmlns:a16="http://schemas.microsoft.com/office/drawing/2014/main" id="{14430949-8163-DB78-4A70-C2D25C65EA98}"/>
+          <p:cNvPr id="5" name="Content Placeholder 4">
+            <a:extLst>
+              <a:ext uri="{FF2B5EF4-FFF2-40B4-BE49-F238E27FC236}">
+                <a16:creationId xmlns:a16="http://schemas.microsoft.com/office/drawing/2014/main" id="{64B5AF8B-C77B-6BBB-9DF3-0C81CBAFCED2}"/>
               </a:ext>
             </a:extLst>
           </p:cNvPr>
@@ -4781,18 +5699,15 @@
         </p:blipFill>
         <p:spPr>
           <a:xfrm>
-            <a:off x="0" y="1378486"/>
-            <a:ext cx="12273150" cy="5323527"/>
+            <a:off x="671714" y="2343704"/>
+            <a:ext cx="10848572" cy="2645545"/>
           </a:xfrm>
-          <a:prstGeom prst="rect">
-            <a:avLst/>
-          </a:prstGeom>
         </p:spPr>
       </p:pic>
     </p:spTree>
     <p:extLst>
       <p:ext uri="{BB962C8B-B14F-4D97-AF65-F5344CB8AC3E}">
-        <p14:creationId xmlns:p14="http://schemas.microsoft.com/office/powerpoint/2010/main" val="2234886692"/>
+        <p14:creationId xmlns:p14="http://schemas.microsoft.com/office/powerpoint/2010/main" val="2543553714"/>
       </p:ext>
     </p:extLst>
   </p:cSld>

</xml_diff>